<commit_message>
Update Rubrics, try to make images larger.
</commit_message>
<xml_diff>
--- a/assets/GitFlow.pptx
+++ b/assets/GitFlow.pptx
@@ -260,18 +260,10 @@
       </p15:sldGuideLst>
     </p:ext>
     <p:ext uri="GoogleSlidesCustomDataVersion2">
-      <go:slidesCustomData xmlns="" xmlns:mc="http://schemas.openxmlformats.org/markup-compatibility/2006" xmlns:mv="urn:schemas-microsoft-com:mac:vml" xmlns:c="http://schemas.openxmlformats.org/drawingml/2006/chart" xmlns:dgm="http://schemas.openxmlformats.org/drawingml/2006/diagram" xmlns:o="urn:schemas-microsoft-com:office:office" xmlns:v="urn:schemas-microsoft-com:vml" xmlns:pvml="urn:schemas-microsoft-com:office:powerpoint" xmlns:com="http://schemas.openxmlformats.org/drawingml/2006/compatibility" xmlns:p14="http://schemas.microsoft.com/office/powerpoint/2010/main" xmlns:p15="http://schemas.microsoft.com/office/powerpoint/2012/main" xmlns:ahyp="http://schemas.microsoft.com/office/drawing/2018/hyperlinkcolor" xmlns:go="http://customooxmlschemas.google.com/" r:id="rId37" roundtripDataSignature="AMtx7mgNpvLgIKuCb3di2fCv9iBndn6Ckg=="/>
+      <go:slidesCustomData xmlns:go="http://customooxmlschemas.google.com/" xmlns:ahyp="http://schemas.microsoft.com/office/drawing/2018/hyperlinkcolor" xmlns:p15="http://schemas.microsoft.com/office/powerpoint/2012/main" xmlns:p14="http://schemas.microsoft.com/office/powerpoint/2010/main" xmlns:com="http://schemas.openxmlformats.org/drawingml/2006/compatibility" xmlns:pvml="urn:schemas-microsoft-com:office:powerpoint" xmlns:v="urn:schemas-microsoft-com:vml" xmlns:o="urn:schemas-microsoft-com:office:office" xmlns:dgm="http://schemas.openxmlformats.org/drawingml/2006/diagram" xmlns:c="http://schemas.openxmlformats.org/drawingml/2006/chart" xmlns:mv="urn:schemas-microsoft-com:mac:vml" xmlns:mc="http://schemas.openxmlformats.org/markup-compatibility/2006" xmlns="" r:id="rId37" roundtripDataSignature="AMtx7mgNpvLgIKuCb3di2fCv9iBndn6Ckg=="/>
     </p:ext>
   </p:extLst>
 </p:presentation>
-</file>
-
-<file path=ppt/revisionInfo.xml><?xml version="1.0" encoding="utf-8"?>
-<p1510:revInfo xmlns:a="http://schemas.openxmlformats.org/drawingml/2006/main" xmlns:r="http://schemas.openxmlformats.org/officeDocument/2006/relationships" xmlns:p1510="http://schemas.microsoft.com/office/powerpoint/2015/10/main">
-  <p1510:revLst>
-    <p1510:client id="{49D13036-AAB8-42C0-AA20-7CE5571B80DE}" v="24" dt="2025-10-13T20:08:54.899"/>
-  </p1510:revLst>
-</p1510:revInfo>
 </file>
 
 <file path=ppt/changesInfos/changesInfo1.xml><?xml version="1.0" encoding="utf-8"?>
@@ -555,14 +547,6 @@
             <pc:docMk/>
             <pc:sldMk cId="4110138189" sldId="271"/>
             <ac:spMk id="5" creationId="{64C758A5-ACD9-B1AB-4416-140B25975444}"/>
-          </ac:spMkLst>
-        </pc:spChg>
-        <pc:spChg chg="del">
-          <ac:chgData name="Teresa Swarthout" userId="2501f1c4df9ee7ad" providerId="LiveId" clId="{24F98B00-3D5F-4008-B75D-17C9EF4F9B72}" dt="2025-10-13T20:08:57.697" v="682" actId="478"/>
-          <ac:spMkLst>
-            <pc:docMk/>
-            <pc:sldMk cId="4110138189" sldId="271"/>
-            <ac:spMk id="50" creationId="{9C034F13-424F-E01C-207A-7AAF2177D493}"/>
           </ac:spMkLst>
         </pc:spChg>
         <pc:cxnChg chg="ord">

</xml_diff>